<commit_message>
Remove some historical data.
</commit_message>
<xml_diff>
--- a/console/app_cover/New Microsoft PowerPoint Presentation.pptx
+++ b/console/app_cover/New Microsoft PowerPoint Presentation.pptx
@@ -144,16 +144,48 @@
 </p:presentation>
 </file>
 
-<file path=ppt/revisionInfo.xml><?xml version="1.0" encoding="utf-8"?>
-<p1510:revInfo xmlns:a="http://schemas.openxmlformats.org/drawingml/2006/main" xmlns:r="http://schemas.openxmlformats.org/officeDocument/2006/relationships" xmlns:p1510="http://schemas.microsoft.com/office/powerpoint/2015/10/main">
-  <p1510:revLst>
-    <p1510:client id="{201B8D59-FAAE-410B-879A-2A105F116255}" v="61" dt="2021-09-20T12:50:01.799"/>
-  </p1510:revLst>
-</p1510:revInfo>
-</file>
-
 <file path=ppt/changesInfos/changesInfo1.xml><?xml version="1.0" encoding="utf-8"?>
 <pc:chgInfo xmlns:a="http://schemas.openxmlformats.org/drawingml/2006/main" xmlns:r="http://schemas.openxmlformats.org/officeDocument/2006/relationships" xmlns:ac="http://schemas.microsoft.com/office/drawing/2013/main/command" xmlns:pc="http://schemas.microsoft.com/office/powerpoint/2013/main/command">
+  <pc:docChgLst>
+    <pc:chgData name="Qingpeng Ding" userId="c9a5f662cf7bb3a5" providerId="LiveId" clId="{AFA7A77A-E5D8-4461-BB8C-557FD427A467}"/>
+    <pc:docChg chg="custSel modSld">
+      <pc:chgData name="Qingpeng Ding" userId="c9a5f662cf7bb3a5" providerId="LiveId" clId="{AFA7A77A-E5D8-4461-BB8C-557FD427A467}" dt="2023-08-31T03:02:19.854" v="51" actId="33524"/>
+      <pc:docMkLst>
+        <pc:docMk/>
+      </pc:docMkLst>
+      <pc:sldChg chg="modSp mod">
+        <pc:chgData name="Qingpeng Ding" userId="c9a5f662cf7bb3a5" providerId="LiveId" clId="{AFA7A77A-E5D8-4461-BB8C-557FD427A467}" dt="2023-08-31T03:02:19.854" v="51" actId="33524"/>
+        <pc:sldMkLst>
+          <pc:docMk/>
+          <pc:sldMk cId="4283716095" sldId="256"/>
+        </pc:sldMkLst>
+        <pc:spChg chg="mod">
+          <ac:chgData name="Qingpeng Ding" userId="c9a5f662cf7bb3a5" providerId="LiveId" clId="{AFA7A77A-E5D8-4461-BB8C-557FD427A467}" dt="2023-08-31T03:00:13.554" v="33" actId="6549"/>
+          <ac:spMkLst>
+            <pc:docMk/>
+            <pc:sldMk cId="4283716095" sldId="256"/>
+            <ac:spMk id="13" creationId="{E8E65472-10A5-4A3A-9221-BC9872A88913}"/>
+          </ac:spMkLst>
+        </pc:spChg>
+        <pc:spChg chg="mod">
+          <ac:chgData name="Qingpeng Ding" userId="c9a5f662cf7bb3a5" providerId="LiveId" clId="{AFA7A77A-E5D8-4461-BB8C-557FD427A467}" dt="2023-08-31T03:02:19.854" v="51" actId="33524"/>
+          <ac:spMkLst>
+            <pc:docMk/>
+            <pc:sldMk cId="4283716095" sldId="256"/>
+            <ac:spMk id="15" creationId="{F5FA99F4-EBBB-4872-81E9-691C200E3CB3}"/>
+          </ac:spMkLst>
+        </pc:spChg>
+        <pc:spChg chg="mod">
+          <ac:chgData name="Qingpeng Ding" userId="c9a5f662cf7bb3a5" providerId="LiveId" clId="{AFA7A77A-E5D8-4461-BB8C-557FD427A467}" dt="2023-08-31T03:01:57.835" v="50" actId="1038"/>
+          <ac:spMkLst>
+            <pc:docMk/>
+            <pc:sldMk cId="4283716095" sldId="256"/>
+            <ac:spMk id="16" creationId="{B5E6A191-0562-4B1D-A6C5-1AFFA8563D38}"/>
+          </ac:spMkLst>
+        </pc:spChg>
+      </pc:sldChg>
+    </pc:docChg>
+  </pc:docChgLst>
   <pc:docChgLst>
     <pc:chgData name="Qingpeng Ding" userId="c9a5f662cf7bb3a5" providerId="LiveId" clId="{201B8D59-FAAE-410B-879A-2A105F116255}"/>
     <pc:docChg chg="addSld modSld">
@@ -351,7 +383,7 @@
           <a:p>
             <a:fld id="{3E18218B-E4E2-43F8-9F44-255E85C025F1}" type="datetimeFigureOut">
               <a:rPr lang="en-US" smtClean="0"/>
-              <a:t>9/20/2021</a:t>
+              <a:t>8/31/2023</a:t>
             </a:fld>
             <a:endParaRPr lang="en-US"/>
           </a:p>
@@ -521,7 +553,7 @@
           <a:p>
             <a:fld id="{3E18218B-E4E2-43F8-9F44-255E85C025F1}" type="datetimeFigureOut">
               <a:rPr lang="en-US" smtClean="0"/>
-              <a:t>9/20/2021</a:t>
+              <a:t>8/31/2023</a:t>
             </a:fld>
             <a:endParaRPr lang="en-US"/>
           </a:p>
@@ -701,7 +733,7 @@
           <a:p>
             <a:fld id="{3E18218B-E4E2-43F8-9F44-255E85C025F1}" type="datetimeFigureOut">
               <a:rPr lang="en-US" smtClean="0"/>
-              <a:t>9/20/2021</a:t>
+              <a:t>8/31/2023</a:t>
             </a:fld>
             <a:endParaRPr lang="en-US"/>
           </a:p>
@@ -871,7 +903,7 @@
           <a:p>
             <a:fld id="{3E18218B-E4E2-43F8-9F44-255E85C025F1}" type="datetimeFigureOut">
               <a:rPr lang="en-US" smtClean="0"/>
-              <a:t>9/20/2021</a:t>
+              <a:t>8/31/2023</a:t>
             </a:fld>
             <a:endParaRPr lang="en-US"/>
           </a:p>
@@ -1115,7 +1147,7 @@
           <a:p>
             <a:fld id="{3E18218B-E4E2-43F8-9F44-255E85C025F1}" type="datetimeFigureOut">
               <a:rPr lang="en-US" smtClean="0"/>
-              <a:t>9/20/2021</a:t>
+              <a:t>8/31/2023</a:t>
             </a:fld>
             <a:endParaRPr lang="en-US"/>
           </a:p>
@@ -1347,7 +1379,7 @@
           <a:p>
             <a:fld id="{3E18218B-E4E2-43F8-9F44-255E85C025F1}" type="datetimeFigureOut">
               <a:rPr lang="en-US" smtClean="0"/>
-              <a:t>9/20/2021</a:t>
+              <a:t>8/31/2023</a:t>
             </a:fld>
             <a:endParaRPr lang="en-US"/>
           </a:p>
@@ -1714,7 +1746,7 @@
           <a:p>
             <a:fld id="{3E18218B-E4E2-43F8-9F44-255E85C025F1}" type="datetimeFigureOut">
               <a:rPr lang="en-US" smtClean="0"/>
-              <a:t>9/20/2021</a:t>
+              <a:t>8/31/2023</a:t>
             </a:fld>
             <a:endParaRPr lang="en-US"/>
           </a:p>
@@ -1832,7 +1864,7 @@
           <a:p>
             <a:fld id="{3E18218B-E4E2-43F8-9F44-255E85C025F1}" type="datetimeFigureOut">
               <a:rPr lang="en-US" smtClean="0"/>
-              <a:t>9/20/2021</a:t>
+              <a:t>8/31/2023</a:t>
             </a:fld>
             <a:endParaRPr lang="en-US"/>
           </a:p>
@@ -1927,7 +1959,7 @@
           <a:p>
             <a:fld id="{3E18218B-E4E2-43F8-9F44-255E85C025F1}" type="datetimeFigureOut">
               <a:rPr lang="en-US" smtClean="0"/>
-              <a:t>9/20/2021</a:t>
+              <a:t>8/31/2023</a:t>
             </a:fld>
             <a:endParaRPr lang="en-US"/>
           </a:p>
@@ -2204,7 +2236,7 @@
           <a:p>
             <a:fld id="{3E18218B-E4E2-43F8-9F44-255E85C025F1}" type="datetimeFigureOut">
               <a:rPr lang="en-US" smtClean="0"/>
-              <a:t>9/20/2021</a:t>
+              <a:t>8/31/2023</a:t>
             </a:fld>
             <a:endParaRPr lang="en-US"/>
           </a:p>
@@ -2461,7 +2493,7 @@
           <a:p>
             <a:fld id="{3E18218B-E4E2-43F8-9F44-255E85C025F1}" type="datetimeFigureOut">
               <a:rPr lang="en-US" smtClean="0"/>
-              <a:t>9/20/2021</a:t>
+              <a:t>8/31/2023</a:t>
             </a:fld>
             <a:endParaRPr lang="en-US"/>
           </a:p>
@@ -2674,7 +2706,7 @@
           <a:p>
             <a:fld id="{3E18218B-E4E2-43F8-9F44-255E85C025F1}" type="datetimeFigureOut">
               <a:rPr lang="en-US" smtClean="0"/>
-              <a:t>9/20/2021</a:t>
+              <a:t>8/31/2023</a:t>
             </a:fld>
             <a:endParaRPr lang="en-US"/>
           </a:p>
@@ -3315,7 +3347,7 @@
                 <a:latin typeface="Arial" panose="020B0604020202020204" pitchFamily="34" charset="0"/>
                 <a:cs typeface="Arial" panose="020B0604020202020204" pitchFamily="34" charset="0"/>
               </a:rPr>
-              <a:t>Surgical Robotics and Devices Laboratory</a:t>
+              <a:t>Surgical Robotics and Instrumentation Lab</a:t>
             </a:r>
           </a:p>
         </p:txBody>
@@ -3403,7 +3435,7 @@
                 <a:latin typeface="Arial" panose="020B0604020202020204" pitchFamily="34" charset="0"/>
                 <a:cs typeface="Arial" panose="020B0604020202020204" pitchFamily="34" charset="0"/>
               </a:rPr>
-              <a:t>V0.2.1</a:t>
+              <a:t>V0.3.0</a:t>
             </a:r>
           </a:p>
           <a:p>
@@ -3437,7 +3469,7 @@
                 <a:latin typeface="Arial" panose="020B0604020202020204" pitchFamily="34" charset="0"/>
                 <a:cs typeface="Arial" panose="020B0604020202020204" pitchFamily="34" charset="0"/>
               </a:rPr>
-              <a:t>September 20, 2021</a:t>
+              <a:t>August 2023</a:t>
             </a:r>
           </a:p>
           <a:p>
@@ -3473,8 +3505,8 @@
         </p:nvSpPr>
         <p:spPr>
           <a:xfrm>
-            <a:off x="755981" y="6016350"/>
-            <a:ext cx="8667419" cy="831959"/>
+            <a:off x="705181" y="6016350"/>
+            <a:ext cx="8667419" cy="446020"/>
           </a:xfrm>
           <a:prstGeom prst="rect">
             <a:avLst/>
@@ -3487,7 +3519,7 @@
           </a:bodyPr>
           <a:lstStyle/>
           <a:p>
-            <a:pPr>
+            <a:pPr algn="ctr">
               <a:lnSpc>
                 <a:spcPct val="114000"/>
               </a:lnSpc>
@@ -3500,7 +3532,7 @@
                 <a:latin typeface="Arial" panose="020B0604020202020204" pitchFamily="34" charset="0"/>
                 <a:cs typeface="Arial" panose="020B0604020202020204" pitchFamily="34" charset="0"/>
               </a:rPr>
-              <a:t>Configure, control and monitor for the MRI compatible neurosurgical robotic system.</a:t>
+              <a:t>Configure and control the MRI compatible robotic system</a:t>
             </a:r>
           </a:p>
         </p:txBody>

</xml_diff>